<commit_message>
create image for ui
</commit_message>
<xml_diff>
--- a/algieba/interface/ui.pptx
+++ b/algieba/interface/ui.pptx
@@ -3891,10 +3891,6 @@
               <a:rPr kumimoji="1" lang="en-US" altLang="ja-JP" dirty="0" smtClean="0"/>
               <a:t>)</a:t>
             </a:r>
-            <a:r>
-              <a:rPr kumimoji="1" lang="en-US" altLang="ja-JP" dirty="0" smtClean="0"/>
-              <a:t/>
-            </a:r>
             <a:br>
               <a:rPr kumimoji="1" lang="en-US" altLang="ja-JP" dirty="0" smtClean="0"/>
             </a:br>
@@ -3928,10 +3924,6 @@
               <a:rPr lang="en-US" altLang="ja-JP" sz="2800" dirty="0" smtClean="0"/>
               <a:t>2016/04/12</a:t>
             </a:r>
-            <a:r>
-              <a:rPr lang="en-US" altLang="ja-JP" sz="2800" dirty="0" smtClean="0"/>
-              <a:t/>
-            </a:r>
             <a:br>
               <a:rPr lang="en-US" altLang="ja-JP" sz="2800" dirty="0" smtClean="0"/>
             </a:br>
@@ -3941,11 +3933,7 @@
             </a:r>
             <a:r>
               <a:rPr lang="en-US" altLang="ja-JP" sz="2800" dirty="0" smtClean="0"/>
-              <a:t> </a:t>
-            </a:r>
-            <a:r>
-              <a:rPr lang="en-US" altLang="ja-JP" sz="2800" dirty="0" smtClean="0"/>
-              <a:t>1.1.0</a:t>
+              <a:t> 1.1.0</a:t>
             </a:r>
             <a:endParaRPr kumimoji="1" lang="ja-JP" altLang="en-US" dirty="0"/>
           </a:p>
@@ -4009,15 +3997,7 @@
                 <a:ea typeface="メイリオ"/>
                 <a:cs typeface="メイリオ"/>
               </a:rPr>
-              <a:t>ブラウザ</a:t>
-            </a:r>
-            <a:r>
-              <a:rPr lang="ja-JP" altLang="en-US" sz="2800" dirty="0" smtClean="0">
-                <a:latin typeface="メイリオ"/>
-                <a:ea typeface="メイリオ"/>
-                <a:cs typeface="メイリオ"/>
-              </a:rPr>
-              <a:t>画面</a:t>
+              <a:t>ブラウザ画面</a:t>
             </a:r>
             <a:endParaRPr kumimoji="1" lang="ja-JP" altLang="en-US" sz="2000" dirty="0">
               <a:latin typeface="メイリオ"/>
@@ -4545,7 +4525,7 @@
           <p:nvPr>
             <p:extLst>
               <p:ext uri="{D42A27DB-BD31-4B8C-83A1-F6EECF244321}">
-                <p14:modId xmlns:p14="http://schemas.microsoft.com/office/powerpoint/2010/main" val="1076515052"/>
+                <p14:modId xmlns:p14="http://schemas.microsoft.com/office/powerpoint/2010/main" val="3657698948"/>
               </p:ext>
             </p:extLst>
           </p:nvPr>

</xml_diff>

<commit_message>
user and app auth (#92)
* upadte ui

* update functional_spec

* update design_spec

* modify anchor

* fix bug

* modify design_spec

* update algieba to 2.2.0

* update CHANGELOG.md
</commit_message>
<xml_diff>
--- a/algieba/interface/ui.pptx
+++ b/algieba/interface/ui.pptx
@@ -5,12 +5,13 @@
     <p:sldMasterId id="2147483648" r:id="rId1"/>
   </p:sldMasterIdLst>
   <p:notesMasterIdLst>
-    <p:notesMasterId r:id="rId5"/>
+    <p:notesMasterId r:id="rId6"/>
   </p:notesMasterIdLst>
   <p:sldIdLst>
     <p:sldId id="256" r:id="rId2"/>
     <p:sldId id="263" r:id="rId3"/>
-    <p:sldId id="265" r:id="rId4"/>
+    <p:sldId id="266" r:id="rId4"/>
+    <p:sldId id="265" r:id="rId5"/>
   </p:sldIdLst>
   <p:sldSz cx="9144000" cy="6858000" type="screen4x3"/>
   <p:notesSz cx="6858000" cy="9144000"/>
@@ -194,7 +195,7 @@
           <a:p>
             <a:fld id="{EE82FEE5-269B-9B49-A8C4-823C45BE6055}" type="datetimeFigureOut">
               <a:rPr kumimoji="1" lang="ja-JP" altLang="en-US" smtClean="0"/>
-              <a:t>16/07/17</a:t>
+              <a:t>16/11/04</a:t>
             </a:fld>
             <a:endParaRPr kumimoji="1" lang="ja-JP" altLang="en-US"/>
           </a:p>
@@ -662,6 +663,90 @@
 </p:notes>
 </file>
 
+<file path=ppt/notesSlides/notesSlide3.xml><?xml version="1.0" encoding="utf-8"?>
+<p:notes xmlns:a="http://schemas.openxmlformats.org/drawingml/2006/main" xmlns:r="http://schemas.openxmlformats.org/officeDocument/2006/relationships" xmlns:p="http://schemas.openxmlformats.org/presentationml/2006/main">
+  <p:cSld>
+    <p:spTree>
+      <p:nvGrpSpPr>
+        <p:cNvPr id="1" name=""/>
+        <p:cNvGrpSpPr/>
+        <p:nvPr/>
+      </p:nvGrpSpPr>
+      <p:grpSpPr>
+        <a:xfrm>
+          <a:off x="0" y="0"/>
+          <a:ext cx="0" cy="0"/>
+          <a:chOff x="0" y="0"/>
+          <a:chExt cx="0" cy="0"/>
+        </a:xfrm>
+      </p:grpSpPr>
+      <p:sp>
+        <p:nvSpPr>
+          <p:cNvPr id="2" name="スライド イメージ プレースホルダー 1"/>
+          <p:cNvSpPr>
+            <a:spLocks noGrp="1" noRot="1" noChangeAspect="1"/>
+          </p:cNvSpPr>
+          <p:nvPr>
+            <p:ph type="sldImg"/>
+          </p:nvPr>
+        </p:nvSpPr>
+        <p:spPr/>
+      </p:sp>
+      <p:sp>
+        <p:nvSpPr>
+          <p:cNvPr id="3" name="ノート プレースホルダー 2"/>
+          <p:cNvSpPr>
+            <a:spLocks noGrp="1"/>
+          </p:cNvSpPr>
+          <p:nvPr>
+            <p:ph type="body" idx="1"/>
+          </p:nvPr>
+        </p:nvSpPr>
+        <p:spPr/>
+        <p:txBody>
+          <a:bodyPr/>
+          <a:lstStyle/>
+          <a:p>
+            <a:endParaRPr kumimoji="1" lang="ja-JP" altLang="en-US" dirty="0"/>
+          </a:p>
+        </p:txBody>
+      </p:sp>
+      <p:sp>
+        <p:nvSpPr>
+          <p:cNvPr id="4" name="スライド番号プレースホルダー 3"/>
+          <p:cNvSpPr>
+            <a:spLocks noGrp="1"/>
+          </p:cNvSpPr>
+          <p:nvPr>
+            <p:ph type="sldNum" sz="quarter" idx="10"/>
+          </p:nvPr>
+        </p:nvSpPr>
+        <p:spPr/>
+        <p:txBody>
+          <a:bodyPr/>
+          <a:lstStyle/>
+          <a:p>
+            <a:fld id="{A9E1B25B-30E5-7A42-A56A-DF1A6F86BC06}" type="slidenum">
+              <a:rPr kumimoji="1" lang="ja-JP" altLang="en-US" smtClean="0"/>
+              <a:t>4</a:t>
+            </a:fld>
+            <a:endParaRPr kumimoji="1" lang="ja-JP" altLang="en-US"/>
+          </a:p>
+        </p:txBody>
+      </p:sp>
+    </p:spTree>
+    <p:extLst>
+      <p:ext uri="{BB962C8B-B14F-4D97-AF65-F5344CB8AC3E}">
+        <p14:creationId xmlns:p14="http://schemas.microsoft.com/office/powerpoint/2010/main" val="3631066132"/>
+      </p:ext>
+    </p:extLst>
+  </p:cSld>
+  <p:clrMapOvr>
+    <a:masterClrMapping/>
+  </p:clrMapOvr>
+</p:notes>
+</file>
+
 <file path=ppt/slideLayouts/slideLayout1.xml><?xml version="1.0" encoding="utf-8"?>
 <p:sldLayout xmlns:a="http://schemas.openxmlformats.org/drawingml/2006/main" xmlns:r="http://schemas.openxmlformats.org/officeDocument/2006/relationships" xmlns:p="http://schemas.openxmlformats.org/presentationml/2006/main" type="title" preserve="1">
   <p:cSld name="タイトル スライド">
@@ -843,7 +928,7 @@
           <a:p>
             <a:fld id="{3ABA01A1-4899-9944-833D-6A66CDE659CB}" type="datetimeFigureOut">
               <a:rPr kumimoji="1" lang="ja-JP" altLang="en-US" smtClean="0"/>
-              <a:t>16/07/17</a:t>
+              <a:t>16/11/04</a:t>
             </a:fld>
             <a:endParaRPr kumimoji="1" lang="ja-JP" altLang="en-US"/>
           </a:p>
@@ -1045,7 +1130,7 @@
           <a:p>
             <a:fld id="{3ABA01A1-4899-9944-833D-6A66CDE659CB}" type="datetimeFigureOut">
               <a:rPr kumimoji="1" lang="ja-JP" altLang="en-US" smtClean="0"/>
-              <a:t>16/07/17</a:t>
+              <a:t>16/11/04</a:t>
             </a:fld>
             <a:endParaRPr kumimoji="1" lang="ja-JP" altLang="en-US"/>
           </a:p>
@@ -1257,7 +1342,7 @@
           <a:p>
             <a:fld id="{3ABA01A1-4899-9944-833D-6A66CDE659CB}" type="datetimeFigureOut">
               <a:rPr kumimoji="1" lang="ja-JP" altLang="en-US" smtClean="0"/>
-              <a:t>16/07/17</a:t>
+              <a:t>16/11/04</a:t>
             </a:fld>
             <a:endParaRPr kumimoji="1" lang="ja-JP" altLang="en-US"/>
           </a:p>
@@ -1459,7 +1544,7 @@
           <a:p>
             <a:fld id="{3ABA01A1-4899-9944-833D-6A66CDE659CB}" type="datetimeFigureOut">
               <a:rPr kumimoji="1" lang="ja-JP" altLang="en-US" smtClean="0"/>
-              <a:t>16/07/17</a:t>
+              <a:t>16/11/04</a:t>
             </a:fld>
             <a:endParaRPr kumimoji="1" lang="ja-JP" altLang="en-US"/>
           </a:p>
@@ -1705,7 +1790,7 @@
           <a:p>
             <a:fld id="{3ABA01A1-4899-9944-833D-6A66CDE659CB}" type="datetimeFigureOut">
               <a:rPr kumimoji="1" lang="ja-JP" altLang="en-US" smtClean="0"/>
-              <a:t>16/07/17</a:t>
+              <a:t>16/11/04</a:t>
             </a:fld>
             <a:endParaRPr kumimoji="1" lang="ja-JP" altLang="en-US"/>
           </a:p>
@@ -2057,7 +2142,7 @@
           <a:p>
             <a:fld id="{3ABA01A1-4899-9944-833D-6A66CDE659CB}" type="datetimeFigureOut">
               <a:rPr kumimoji="1" lang="ja-JP" altLang="en-US" smtClean="0"/>
-              <a:t>16/07/17</a:t>
+              <a:t>16/11/04</a:t>
             </a:fld>
             <a:endParaRPr kumimoji="1" lang="ja-JP" altLang="en-US"/>
           </a:p>
@@ -2543,7 +2628,7 @@
           <a:p>
             <a:fld id="{3ABA01A1-4899-9944-833D-6A66CDE659CB}" type="datetimeFigureOut">
               <a:rPr kumimoji="1" lang="ja-JP" altLang="en-US" smtClean="0"/>
-              <a:t>16/07/17</a:t>
+              <a:t>16/11/04</a:t>
             </a:fld>
             <a:endParaRPr kumimoji="1" lang="ja-JP" altLang="en-US"/>
           </a:p>
@@ -2661,7 +2746,7 @@
           <a:p>
             <a:fld id="{3ABA01A1-4899-9944-833D-6A66CDE659CB}" type="datetimeFigureOut">
               <a:rPr kumimoji="1" lang="ja-JP" altLang="en-US" smtClean="0"/>
-              <a:t>16/07/17</a:t>
+              <a:t>16/11/04</a:t>
             </a:fld>
             <a:endParaRPr kumimoji="1" lang="ja-JP" altLang="en-US"/>
           </a:p>
@@ -2756,7 +2841,7 @@
           <a:p>
             <a:fld id="{3ABA01A1-4899-9944-833D-6A66CDE659CB}" type="datetimeFigureOut">
               <a:rPr kumimoji="1" lang="ja-JP" altLang="en-US" smtClean="0"/>
-              <a:t>16/07/17</a:t>
+              <a:t>16/11/04</a:t>
             </a:fld>
             <a:endParaRPr kumimoji="1" lang="ja-JP" altLang="en-US"/>
           </a:p>
@@ -3065,7 +3150,7 @@
           <a:p>
             <a:fld id="{3ABA01A1-4899-9944-833D-6A66CDE659CB}" type="datetimeFigureOut">
               <a:rPr kumimoji="1" lang="ja-JP" altLang="en-US" smtClean="0"/>
-              <a:t>16/07/17</a:t>
+              <a:t>16/11/04</a:t>
             </a:fld>
             <a:endParaRPr kumimoji="1" lang="ja-JP" altLang="en-US"/>
           </a:p>
@@ -3318,7 +3403,7 @@
           <a:p>
             <a:fld id="{3ABA01A1-4899-9944-833D-6A66CDE659CB}" type="datetimeFigureOut">
               <a:rPr kumimoji="1" lang="ja-JP" altLang="en-US" smtClean="0"/>
-              <a:t>16/07/17</a:t>
+              <a:t>16/11/04</a:t>
             </a:fld>
             <a:endParaRPr kumimoji="1" lang="ja-JP" altLang="en-US"/>
           </a:p>
@@ -3563,7 +3648,7 @@
           <a:p>
             <a:fld id="{3ABA01A1-4899-9944-833D-6A66CDE659CB}" type="datetimeFigureOut">
               <a:rPr kumimoji="1" lang="ja-JP" altLang="en-US" smtClean="0"/>
-              <a:t>16/07/17</a:t>
+              <a:t>16/11/04</a:t>
             </a:fld>
             <a:endParaRPr kumimoji="1" lang="ja-JP" altLang="en-US"/>
           </a:p>
@@ -4007,11 +4092,19 @@
             </a:r>
             <a:r>
               <a:rPr lang="en-US" altLang="ja-JP" sz="2800" dirty="0" smtClean="0"/>
-              <a:t>2016/</a:t>
+              <a:t>2016</a:t>
             </a:r>
             <a:r>
               <a:rPr lang="en-US" altLang="ja-JP" sz="2800" dirty="0" smtClean="0"/>
-              <a:t>07/17</a:t>
+              <a:t>/</a:t>
+            </a:r>
+            <a:r>
+              <a:rPr lang="en-US" altLang="ja-JP" sz="2800" dirty="0" smtClean="0"/>
+              <a:t>11</a:t>
+            </a:r>
+            <a:r>
+              <a:rPr lang="en-US" altLang="ja-JP" sz="2800" dirty="0" smtClean="0"/>
+              <a:t>/04</a:t>
             </a:r>
             <a:r>
               <a:rPr lang="en-US" altLang="ja-JP" sz="2800" dirty="0" smtClean="0"/>
@@ -4030,7 +4123,7 @@
             </a:r>
             <a:r>
               <a:rPr lang="en-US" altLang="ja-JP" sz="2800" dirty="0" smtClean="0"/>
-              <a:t>2.1.0</a:t>
+              <a:t>2.2.0</a:t>
             </a:r>
             <a:endParaRPr kumimoji="1" lang="ja-JP" altLang="en-US" dirty="0"/>
           </a:p>
@@ -4094,15 +4187,7 @@
                 <a:ea typeface="メイリオ"/>
                 <a:cs typeface="メイリオ"/>
               </a:rPr>
-              <a:t>画面</a:t>
-            </a:r>
-            <a:r>
-              <a:rPr lang="ja-JP" altLang="en-US" sz="2800" dirty="0" smtClean="0">
-                <a:latin typeface="メイリオ"/>
-                <a:ea typeface="メイリオ"/>
-                <a:cs typeface="メイリオ"/>
-              </a:rPr>
-              <a:t>仕様</a:t>
+              <a:t>画面仕様</a:t>
             </a:r>
             <a:endParaRPr kumimoji="1" lang="ja-JP" altLang="en-US" sz="2000" dirty="0">
               <a:latin typeface="メイリオ"/>
@@ -4121,7 +4206,7 @@
         <p:spPr>
           <a:xfrm>
             <a:off x="646545" y="969818"/>
-            <a:ext cx="7148111" cy="1754327"/>
+            <a:ext cx="7378943" cy="3416320"/>
           </a:xfrm>
           <a:prstGeom prst="rect">
             <a:avLst/>
@@ -4144,7 +4229,7 @@
                 <a:ea typeface="メイリオ"/>
                 <a:cs typeface="メイリオ"/>
               </a:rPr>
-              <a:t>家計簿情報を入力後、登録ボタンを押すと家計簿が登録される</a:t>
+              <a:t>認証画面と管理画面がある</a:t>
             </a:r>
             <a:endParaRPr lang="en-US" altLang="ja-JP" dirty="0" smtClean="0">
               <a:latin typeface="メイリオ"/>
@@ -4153,7 +4238,18 @@
             </a:endParaRPr>
           </a:p>
           <a:p>
-            <a:pPr marL="742950" lvl="1" indent="-285750">
+            <a:pPr marL="285750" indent="-285750">
+              <a:buFont typeface="Arial"/>
+              <a:buChar char="•"/>
+            </a:pPr>
+            <a:endParaRPr lang="en-US" altLang="ja-JP" dirty="0" smtClean="0">
+              <a:latin typeface="メイリオ"/>
+              <a:ea typeface="メイリオ"/>
+              <a:cs typeface="メイリオ"/>
+            </a:endParaRPr>
+          </a:p>
+          <a:p>
+            <a:pPr marL="285750" indent="-285750">
               <a:buFont typeface="Arial"/>
               <a:buChar char="•"/>
             </a:pPr>
@@ -4163,7 +4259,7 @@
                 <a:ea typeface="メイリオ"/>
                 <a:cs typeface="メイリオ"/>
               </a:rPr>
-              <a:t>登録成功時、画面遷移なしで家計簿表の上部に表示される</a:t>
+              <a:t>認証画面</a:t>
             </a:r>
             <a:endParaRPr lang="en-US" altLang="ja-JP" dirty="0" smtClean="0">
               <a:latin typeface="メイリオ"/>
@@ -4172,10 +4268,86 @@
             </a:endParaRPr>
           </a:p>
           <a:p>
+            <a:pPr marL="742950" lvl="1" indent="-285750">
+              <a:buFont typeface="Arial"/>
+              <a:buChar char="•"/>
+            </a:pPr>
+            <a:r>
+              <a:rPr lang="ja-JP" altLang="en-US" dirty="0" smtClean="0">
+                <a:latin typeface="メイリオ"/>
+                <a:ea typeface="メイリオ"/>
+                <a:cs typeface="メイリオ"/>
+              </a:rPr>
+              <a:t>未認証時は認証画面にリダイレクトされる</a:t>
+            </a:r>
+            <a:endParaRPr lang="en-US" altLang="ja-JP" dirty="0" smtClean="0">
+              <a:latin typeface="メイリオ"/>
+              <a:ea typeface="メイリオ"/>
+              <a:cs typeface="メイリオ"/>
+            </a:endParaRPr>
+          </a:p>
+          <a:p>
+            <a:pPr marL="742950" lvl="1" indent="-285750">
+              <a:buFont typeface="Arial"/>
+              <a:buChar char="•"/>
+            </a:pPr>
+            <a:r>
+              <a:rPr lang="ja-JP" altLang="en-US" dirty="0" smtClean="0">
+                <a:latin typeface="メイリオ"/>
+                <a:ea typeface="メイリオ"/>
+                <a:cs typeface="メイリオ"/>
+              </a:rPr>
+              <a:t>認証に成功すると管理画面にアクセスできる</a:t>
+            </a:r>
+            <a:endParaRPr lang="en-US" altLang="ja-JP" dirty="0" smtClean="0">
+              <a:latin typeface="メイリオ"/>
+              <a:ea typeface="メイリオ"/>
+              <a:cs typeface="メイリオ"/>
+            </a:endParaRPr>
+          </a:p>
+          <a:p>
             <a:pPr marL="285750" indent="-285750">
               <a:buFont typeface="Arial"/>
               <a:buChar char="•"/>
             </a:pPr>
+            <a:endParaRPr lang="en-US" altLang="ja-JP" dirty="0" smtClean="0">
+              <a:latin typeface="メイリオ"/>
+              <a:ea typeface="メイリオ"/>
+              <a:cs typeface="メイリオ"/>
+            </a:endParaRPr>
+          </a:p>
+          <a:p>
+            <a:pPr marL="285750" indent="-285750">
+              <a:buFont typeface="Arial"/>
+              <a:buChar char="•"/>
+            </a:pPr>
+            <a:r>
+              <a:rPr lang="ja-JP" altLang="en-US" dirty="0" smtClean="0">
+                <a:latin typeface="メイリオ"/>
+                <a:ea typeface="メイリオ"/>
+                <a:cs typeface="メイリオ"/>
+              </a:rPr>
+              <a:t>管理画面</a:t>
+            </a:r>
+            <a:endParaRPr lang="en-US" altLang="ja-JP" dirty="0" smtClean="0">
+              <a:latin typeface="メイリオ"/>
+              <a:ea typeface="メイリオ"/>
+              <a:cs typeface="メイリオ"/>
+            </a:endParaRPr>
+          </a:p>
+          <a:p>
+            <a:pPr marL="742950" lvl="1" indent="-285750">
+              <a:buFont typeface="Arial"/>
+              <a:buChar char="•"/>
+            </a:pPr>
+            <a:r>
+              <a:rPr lang="ja-JP" altLang="en-US" dirty="0" smtClean="0">
+                <a:latin typeface="メイリオ"/>
+                <a:ea typeface="メイリオ"/>
+                <a:cs typeface="メイリオ"/>
+              </a:rPr>
+              <a:t>画面上部の入力フォームから家計簿を入力する</a:t>
+            </a:r>
             <a:endParaRPr lang="en-US" altLang="ja-JP" dirty="0">
               <a:latin typeface="メイリオ"/>
               <a:ea typeface="メイリオ"/>
@@ -4183,7 +4355,61 @@
             </a:endParaRPr>
           </a:p>
           <a:p>
-            <a:pPr marL="285750" indent="-285750">
+            <a:pPr marL="742950" lvl="1" indent="-285750">
+              <a:buFont typeface="Arial"/>
+              <a:buChar char="•"/>
+            </a:pPr>
+            <a:r>
+              <a:rPr lang="ja-JP" altLang="en-US" dirty="0" smtClean="0">
+                <a:latin typeface="メイリオ"/>
+                <a:ea typeface="メイリオ"/>
+                <a:cs typeface="メイリオ"/>
+              </a:rPr>
+              <a:t>家計簿</a:t>
+            </a:r>
+            <a:r>
+              <a:rPr lang="ja-JP" altLang="en-US" dirty="0" smtClean="0">
+                <a:latin typeface="メイリオ"/>
+                <a:ea typeface="メイリオ"/>
+                <a:cs typeface="メイリオ"/>
+              </a:rPr>
+              <a:t>情報を入力後、登録ボタンを押すと家計簿が登録される</a:t>
+            </a:r>
+            <a:endParaRPr lang="en-US" altLang="ja-JP" dirty="0" smtClean="0">
+              <a:latin typeface="メイリオ"/>
+              <a:ea typeface="メイリオ"/>
+              <a:cs typeface="メイリオ"/>
+            </a:endParaRPr>
+          </a:p>
+          <a:p>
+            <a:pPr marL="742950" lvl="1" indent="-285750">
+              <a:buFont typeface="Arial"/>
+              <a:buChar char="•"/>
+            </a:pPr>
+            <a:r>
+              <a:rPr lang="ja-JP" altLang="en-US" dirty="0" smtClean="0">
+                <a:latin typeface="メイリオ"/>
+                <a:ea typeface="メイリオ"/>
+                <a:cs typeface="メイリオ"/>
+              </a:rPr>
+              <a:t>登録成功時、画面遷移なしで家計簿表の上部に表示</a:t>
+            </a:r>
+            <a:r>
+              <a:rPr lang="ja-JP" altLang="en-US" dirty="0" smtClean="0">
+                <a:latin typeface="メイリオ"/>
+                <a:ea typeface="メイリオ"/>
+                <a:cs typeface="メイリオ"/>
+              </a:rPr>
+              <a:t>される</a:t>
+            </a:r>
+            <a:endParaRPr lang="en-US" altLang="ja-JP" dirty="0">
+              <a:latin typeface="メイリオ"/>
+              <a:ea typeface="メイリオ"/>
+              <a:cs typeface="メイリオ"/>
+            </a:endParaRPr>
+          </a:p>
+          <a:p>
+            <a:pPr marL="742950" lvl="1" indent="-285750">
               <a:buFont typeface="Arial"/>
               <a:buChar char="•"/>
             </a:pPr>
@@ -4227,17 +4453,6 @@
               </a:rPr>
               <a:t>される</a:t>
             </a:r>
-            <a:endParaRPr lang="en-US" altLang="ja-JP" dirty="0" smtClean="0">
-              <a:latin typeface="メイリオ"/>
-              <a:ea typeface="メイリオ"/>
-              <a:cs typeface="メイリオ"/>
-            </a:endParaRPr>
-          </a:p>
-          <a:p>
-            <a:pPr marL="285750" indent="-285750">
-              <a:buFont typeface="Arial"/>
-              <a:buChar char="•"/>
-            </a:pPr>
             <a:endParaRPr lang="en-US" altLang="ja-JP" dirty="0">
               <a:latin typeface="メイリオ"/>
               <a:ea typeface="メイリオ"/>
@@ -4245,23 +4460,26 @@
             </a:endParaRPr>
           </a:p>
           <a:p>
-            <a:pPr marL="285750" indent="-285750">
+            <a:pPr marL="742950" lvl="1" indent="-285750">
               <a:buFont typeface="Arial"/>
               <a:buChar char="•"/>
             </a:pPr>
+            <a:r>
+              <a:rPr lang="ja-JP" altLang="en-US" dirty="0" smtClean="0">
+                <a:latin typeface="メイリオ"/>
+                <a:ea typeface="メイリオ"/>
+                <a:cs typeface="メイリオ"/>
+              </a:rPr>
+              <a:t>最新</a:t>
+            </a:r>
             <a:r>
               <a:rPr lang="ja-JP" altLang="en-US" dirty="0">
                 <a:latin typeface="メイリオ"/>
                 <a:ea typeface="メイリオ"/>
                 <a:cs typeface="メイリオ"/>
               </a:rPr>
-              <a:t>最新から順番に表示される</a:t>
-            </a:r>
-            <a:endParaRPr lang="ja-JP" altLang="en-US" dirty="0">
-              <a:latin typeface="メイリオ"/>
-              <a:ea typeface="メイリオ"/>
-              <a:cs typeface="メイリオ"/>
-            </a:endParaRPr>
+              <a:t>から順番に表示される</a:t>
+            </a:r>
           </a:p>
         </p:txBody>
       </p:sp>
@@ -4304,7 +4522,7 @@
         <p:spPr>
           <a:xfrm>
             <a:off x="200532" y="187161"/>
-            <a:ext cx="2339102" cy="523220"/>
+            <a:ext cx="1620957" cy="523220"/>
           </a:xfrm>
           <a:prstGeom prst="rect">
             <a:avLst/>
@@ -4323,7 +4541,555 @@
                 <a:ea typeface="メイリオ"/>
                 <a:cs typeface="メイリオ"/>
               </a:rPr>
-              <a:t>ブラウザ画面</a:t>
+              <a:t>認証</a:t>
+            </a:r>
+            <a:r>
+              <a:rPr lang="ja-JP" altLang="en-US" sz="2800" dirty="0" smtClean="0">
+                <a:latin typeface="メイリオ"/>
+                <a:ea typeface="メイリオ"/>
+                <a:cs typeface="メイリオ"/>
+              </a:rPr>
+              <a:t>画面</a:t>
+            </a:r>
+            <a:endParaRPr kumimoji="1" lang="ja-JP" altLang="en-US" sz="2000" dirty="0">
+              <a:latin typeface="メイリオ"/>
+              <a:ea typeface="メイリオ"/>
+              <a:cs typeface="メイリオ"/>
+            </a:endParaRPr>
+          </a:p>
+        </p:txBody>
+      </p:sp>
+      <p:grpSp>
+        <p:nvGrpSpPr>
+          <p:cNvPr id="8" name="図形グループ 7"/>
+          <p:cNvGrpSpPr/>
+          <p:nvPr/>
+        </p:nvGrpSpPr>
+        <p:grpSpPr>
+          <a:xfrm>
+            <a:off x="783269" y="935182"/>
+            <a:ext cx="7575640" cy="5541817"/>
+            <a:chOff x="783269" y="935182"/>
+            <a:chExt cx="7575640" cy="5541817"/>
+          </a:xfrm>
+        </p:grpSpPr>
+        <p:sp>
+          <p:nvSpPr>
+            <p:cNvPr id="53" name="正方形/長方形 52"/>
+            <p:cNvSpPr/>
+            <p:nvPr/>
+          </p:nvSpPr>
+          <p:spPr>
+            <a:xfrm>
+              <a:off x="783269" y="935182"/>
+              <a:ext cx="7575640" cy="5541817"/>
+            </a:xfrm>
+            <a:prstGeom prst="rect">
+              <a:avLst/>
+            </a:prstGeom>
+            <a:noFill/>
+            <a:ln w="25400">
+              <a:solidFill>
+                <a:schemeClr val="tx1"/>
+              </a:solidFill>
+            </a:ln>
+            <a:effectLst/>
+          </p:spPr>
+          <p:style>
+            <a:lnRef idx="1">
+              <a:schemeClr val="accent1"/>
+            </a:lnRef>
+            <a:fillRef idx="3">
+              <a:schemeClr val="accent1"/>
+            </a:fillRef>
+            <a:effectRef idx="2">
+              <a:schemeClr val="accent1"/>
+            </a:effectRef>
+            <a:fontRef idx="minor">
+              <a:schemeClr val="lt1"/>
+            </a:fontRef>
+          </p:style>
+          <p:txBody>
+            <a:bodyPr rtlCol="0" anchor="ctr"/>
+            <a:lstStyle/>
+            <a:p>
+              <a:pPr algn="ctr"/>
+              <a:endParaRPr kumimoji="1" lang="ja-JP" altLang="en-US" sz="2800" dirty="0">
+                <a:solidFill>
+                  <a:schemeClr val="tx1"/>
+                </a:solidFill>
+                <a:latin typeface="メイリオ"/>
+                <a:ea typeface="メイリオ"/>
+                <a:cs typeface="メイリオ"/>
+              </a:endParaRPr>
+            </a:p>
+          </p:txBody>
+        </p:sp>
+        <p:sp>
+          <p:nvSpPr>
+            <p:cNvPr id="21" name="角丸四角形 20"/>
+            <p:cNvSpPr/>
+            <p:nvPr/>
+          </p:nvSpPr>
+          <p:spPr>
+            <a:xfrm>
+              <a:off x="3059362" y="2228031"/>
+              <a:ext cx="2979091" cy="2967423"/>
+            </a:xfrm>
+            <a:prstGeom prst="roundRect">
+              <a:avLst/>
+            </a:prstGeom>
+            <a:noFill/>
+            <a:ln w="25400">
+              <a:solidFill>
+                <a:schemeClr val="tx1"/>
+              </a:solidFill>
+            </a:ln>
+            <a:effectLst/>
+          </p:spPr>
+          <p:style>
+            <a:lnRef idx="1">
+              <a:schemeClr val="accent1"/>
+            </a:lnRef>
+            <a:fillRef idx="3">
+              <a:schemeClr val="accent1"/>
+            </a:fillRef>
+            <a:effectRef idx="2">
+              <a:schemeClr val="accent1"/>
+            </a:effectRef>
+            <a:fontRef idx="minor">
+              <a:schemeClr val="lt1"/>
+            </a:fontRef>
+          </p:style>
+          <p:txBody>
+            <a:bodyPr rtlCol="0" anchor="ctr"/>
+            <a:lstStyle/>
+            <a:p>
+              <a:pPr algn="ctr"/>
+              <a:endParaRPr kumimoji="1" lang="ja-JP" altLang="en-US"/>
+            </a:p>
+          </p:txBody>
+        </p:sp>
+        <p:sp>
+          <p:nvSpPr>
+            <p:cNvPr id="22" name="テキスト ボックス 21"/>
+            <p:cNvSpPr txBox="1"/>
+            <p:nvPr/>
+          </p:nvSpPr>
+          <p:spPr>
+            <a:xfrm>
+              <a:off x="3186840" y="2516692"/>
+              <a:ext cx="1289147" cy="307777"/>
+            </a:xfrm>
+            <a:prstGeom prst="rect">
+              <a:avLst/>
+            </a:prstGeom>
+            <a:noFill/>
+          </p:spPr>
+          <p:txBody>
+            <a:bodyPr wrap="none" rtlCol="0">
+              <a:spAutoFit/>
+            </a:bodyPr>
+            <a:lstStyle/>
+            <a:p>
+              <a:r>
+                <a:rPr lang="en-US" altLang="en-US" sz="1400" dirty="0" err="1" smtClean="0">
+                  <a:latin typeface="メイリオ"/>
+                  <a:ea typeface="メイリオ"/>
+                  <a:cs typeface="メイリオ"/>
+                </a:rPr>
+                <a:t>ユーザーID</a:t>
+              </a:r>
+              <a:r>
+                <a:rPr kumimoji="1" lang="ja-JP" altLang="en-US" sz="1400" dirty="0" smtClean="0">
+                  <a:latin typeface="メイリオ"/>
+                  <a:ea typeface="メイリオ"/>
+                  <a:cs typeface="メイリオ"/>
+                </a:rPr>
+                <a:t>：</a:t>
+              </a:r>
+              <a:endParaRPr kumimoji="1" lang="ja-JP" altLang="en-US" sz="1400" dirty="0">
+                <a:latin typeface="メイリオ"/>
+                <a:ea typeface="メイリオ"/>
+                <a:cs typeface="メイリオ"/>
+              </a:endParaRPr>
+            </a:p>
+          </p:txBody>
+        </p:sp>
+        <p:sp>
+          <p:nvSpPr>
+            <p:cNvPr id="23" name="正方形/長方形 22"/>
+            <p:cNvSpPr/>
+            <p:nvPr/>
+          </p:nvSpPr>
+          <p:spPr>
+            <a:xfrm>
+              <a:off x="3429000" y="2944112"/>
+              <a:ext cx="2299854" cy="406399"/>
+            </a:xfrm>
+            <a:prstGeom prst="rect">
+              <a:avLst/>
+            </a:prstGeom>
+            <a:noFill/>
+            <a:ln w="25400">
+              <a:solidFill>
+                <a:schemeClr val="tx1"/>
+              </a:solidFill>
+            </a:ln>
+            <a:effectLst>
+              <a:outerShdw blurRad="50800" dist="38100" dir="2700000" algn="tl" rotWithShape="0">
+                <a:srgbClr val="000000">
+                  <a:alpha val="43000"/>
+                </a:srgbClr>
+              </a:outerShdw>
+            </a:effectLst>
+          </p:spPr>
+          <p:style>
+            <a:lnRef idx="1">
+              <a:schemeClr val="accent1"/>
+            </a:lnRef>
+            <a:fillRef idx="3">
+              <a:schemeClr val="accent1"/>
+            </a:fillRef>
+            <a:effectRef idx="2">
+              <a:schemeClr val="accent1"/>
+            </a:effectRef>
+            <a:fontRef idx="minor">
+              <a:schemeClr val="lt1"/>
+            </a:fontRef>
+          </p:style>
+          <p:txBody>
+            <a:bodyPr rtlCol="0" anchor="ctr"/>
+            <a:lstStyle/>
+            <a:p>
+              <a:pPr algn="ctr"/>
+              <a:endParaRPr kumimoji="1" lang="ja-JP" altLang="en-US" sz="2800" dirty="0">
+                <a:solidFill>
+                  <a:schemeClr val="tx1"/>
+                </a:solidFill>
+                <a:latin typeface="メイリオ"/>
+                <a:ea typeface="メイリオ"/>
+                <a:cs typeface="メイリオ"/>
+              </a:endParaRPr>
+            </a:p>
+          </p:txBody>
+        </p:sp>
+        <p:sp>
+          <p:nvSpPr>
+            <p:cNvPr id="24" name="テキスト ボックス 23"/>
+            <p:cNvSpPr txBox="1"/>
+            <p:nvPr/>
+          </p:nvSpPr>
+          <p:spPr>
+            <a:xfrm>
+              <a:off x="3186840" y="3523456"/>
+              <a:ext cx="1261884" cy="307777"/>
+            </a:xfrm>
+            <a:prstGeom prst="rect">
+              <a:avLst/>
+            </a:prstGeom>
+            <a:noFill/>
+          </p:spPr>
+          <p:txBody>
+            <a:bodyPr wrap="none" rtlCol="0">
+              <a:spAutoFit/>
+            </a:bodyPr>
+            <a:lstStyle/>
+            <a:p>
+              <a:r>
+                <a:rPr lang="ja-JP" altLang="en-US" sz="1400" dirty="0" smtClean="0">
+                  <a:latin typeface="メイリオ"/>
+                  <a:ea typeface="メイリオ"/>
+                  <a:cs typeface="メイリオ"/>
+                </a:rPr>
+                <a:t>パスワード</a:t>
+              </a:r>
+              <a:r>
+                <a:rPr kumimoji="1" lang="ja-JP" altLang="en-US" sz="1400" dirty="0" smtClean="0">
+                  <a:latin typeface="メイリオ"/>
+                  <a:ea typeface="メイリオ"/>
+                  <a:cs typeface="メイリオ"/>
+                </a:rPr>
+                <a:t>：</a:t>
+              </a:r>
+              <a:endParaRPr kumimoji="1" lang="ja-JP" altLang="en-US" sz="1400" dirty="0">
+                <a:latin typeface="メイリオ"/>
+                <a:ea typeface="メイリオ"/>
+                <a:cs typeface="メイリオ"/>
+              </a:endParaRPr>
+            </a:p>
+          </p:txBody>
+        </p:sp>
+        <p:sp>
+          <p:nvSpPr>
+            <p:cNvPr id="25" name="正方形/長方形 24"/>
+            <p:cNvSpPr/>
+            <p:nvPr/>
+          </p:nvSpPr>
+          <p:spPr>
+            <a:xfrm>
+              <a:off x="3429000" y="3833304"/>
+              <a:ext cx="2299854" cy="406399"/>
+            </a:xfrm>
+            <a:prstGeom prst="rect">
+              <a:avLst/>
+            </a:prstGeom>
+            <a:noFill/>
+            <a:ln w="25400">
+              <a:solidFill>
+                <a:schemeClr val="tx1"/>
+              </a:solidFill>
+            </a:ln>
+            <a:effectLst>
+              <a:outerShdw blurRad="50800" dist="38100" dir="2700000" algn="tl" rotWithShape="0">
+                <a:srgbClr val="000000">
+                  <a:alpha val="43000"/>
+                </a:srgbClr>
+              </a:outerShdw>
+            </a:effectLst>
+          </p:spPr>
+          <p:style>
+            <a:lnRef idx="1">
+              <a:schemeClr val="accent1"/>
+            </a:lnRef>
+            <a:fillRef idx="3">
+              <a:schemeClr val="accent1"/>
+            </a:fillRef>
+            <a:effectRef idx="2">
+              <a:schemeClr val="accent1"/>
+            </a:effectRef>
+            <a:fontRef idx="minor">
+              <a:schemeClr val="lt1"/>
+            </a:fontRef>
+          </p:style>
+          <p:txBody>
+            <a:bodyPr rtlCol="0" anchor="ctr"/>
+            <a:lstStyle/>
+            <a:p>
+              <a:pPr algn="ctr"/>
+              <a:endParaRPr kumimoji="1" lang="ja-JP" altLang="en-US" sz="2800" dirty="0">
+                <a:solidFill>
+                  <a:schemeClr val="tx1"/>
+                </a:solidFill>
+                <a:latin typeface="メイリオ"/>
+                <a:ea typeface="メイリオ"/>
+                <a:cs typeface="メイリオ"/>
+              </a:endParaRPr>
+            </a:p>
+          </p:txBody>
+        </p:sp>
+        <p:sp>
+          <p:nvSpPr>
+            <p:cNvPr id="26" name="角丸四角形 25"/>
+            <p:cNvSpPr/>
+            <p:nvPr/>
+          </p:nvSpPr>
+          <p:spPr>
+            <a:xfrm>
+              <a:off x="4167908" y="4525818"/>
+              <a:ext cx="1560945" cy="417945"/>
+            </a:xfrm>
+            <a:prstGeom prst="roundRect">
+              <a:avLst/>
+            </a:prstGeom>
+            <a:solidFill>
+              <a:schemeClr val="accent1"/>
+            </a:solidFill>
+            <a:ln w="25400">
+              <a:noFill/>
+            </a:ln>
+            <a:effectLst/>
+            <a:scene3d>
+              <a:camera prst="orthographicFront"/>
+              <a:lightRig rig="threePt" dir="t"/>
+            </a:scene3d>
+            <a:sp3d>
+              <a:bevelT/>
+            </a:sp3d>
+          </p:spPr>
+          <p:style>
+            <a:lnRef idx="1">
+              <a:schemeClr val="accent1"/>
+            </a:lnRef>
+            <a:fillRef idx="3">
+              <a:schemeClr val="accent1"/>
+            </a:fillRef>
+            <a:effectRef idx="2">
+              <a:schemeClr val="accent1"/>
+            </a:effectRef>
+            <a:fontRef idx="minor">
+              <a:schemeClr val="lt1"/>
+            </a:fontRef>
+          </p:style>
+          <p:txBody>
+            <a:bodyPr rtlCol="0" anchor="ctr"/>
+            <a:lstStyle/>
+            <a:p>
+              <a:pPr algn="ctr"/>
+              <a:r>
+                <a:rPr lang="ja-JP" altLang="en-US" dirty="0" smtClean="0">
+                  <a:solidFill>
+                    <a:schemeClr val="tx1"/>
+                  </a:solidFill>
+                  <a:latin typeface="メイリオ"/>
+                  <a:ea typeface="メイリオ"/>
+                  <a:cs typeface="メイリオ"/>
+                </a:rPr>
+                <a:t>ログイン</a:t>
+              </a:r>
+              <a:endParaRPr kumimoji="1" lang="ja-JP" altLang="en-US" dirty="0">
+                <a:solidFill>
+                  <a:schemeClr val="tx1"/>
+                </a:solidFill>
+                <a:latin typeface="メイリオ"/>
+                <a:ea typeface="メイリオ"/>
+                <a:cs typeface="メイリオ"/>
+              </a:endParaRPr>
+            </a:p>
+          </p:txBody>
+        </p:sp>
+        <p:cxnSp>
+          <p:nvCxnSpPr>
+            <p:cNvPr id="3" name="直線コネクタ 2"/>
+            <p:cNvCxnSpPr/>
+            <p:nvPr/>
+          </p:nvCxnSpPr>
+          <p:spPr>
+            <a:xfrm>
+              <a:off x="3532910" y="3048002"/>
+              <a:ext cx="0" cy="219382"/>
+            </a:xfrm>
+            <a:prstGeom prst="line">
+              <a:avLst/>
+            </a:prstGeom>
+            <a:ln w="12700">
+              <a:solidFill>
+                <a:schemeClr val="bg1">
+                  <a:lumMod val="50000"/>
+                </a:schemeClr>
+              </a:solidFill>
+            </a:ln>
+          </p:spPr>
+          <p:style>
+            <a:lnRef idx="2">
+              <a:schemeClr val="accent1"/>
+            </a:lnRef>
+            <a:fillRef idx="0">
+              <a:schemeClr val="accent1"/>
+            </a:fillRef>
+            <a:effectRef idx="1">
+              <a:schemeClr val="accent1"/>
+            </a:effectRef>
+            <a:fontRef idx="minor">
+              <a:schemeClr val="tx1"/>
+            </a:fontRef>
+          </p:style>
+        </p:cxnSp>
+        <p:cxnSp>
+          <p:nvCxnSpPr>
+            <p:cNvPr id="32" name="直線コネクタ 31"/>
+            <p:cNvCxnSpPr/>
+            <p:nvPr/>
+          </p:nvCxnSpPr>
+          <p:spPr>
+            <a:xfrm>
+              <a:off x="3532910" y="3939311"/>
+              <a:ext cx="0" cy="219382"/>
+            </a:xfrm>
+            <a:prstGeom prst="line">
+              <a:avLst/>
+            </a:prstGeom>
+            <a:ln w="12700">
+              <a:solidFill>
+                <a:schemeClr val="bg1">
+                  <a:lumMod val="50000"/>
+                </a:schemeClr>
+              </a:solidFill>
+            </a:ln>
+          </p:spPr>
+          <p:style>
+            <a:lnRef idx="2">
+              <a:schemeClr val="accent1"/>
+            </a:lnRef>
+            <a:fillRef idx="0">
+              <a:schemeClr val="accent1"/>
+            </a:fillRef>
+            <a:effectRef idx="1">
+              <a:schemeClr val="accent1"/>
+            </a:effectRef>
+            <a:fontRef idx="minor">
+              <a:schemeClr val="tx1"/>
+            </a:fontRef>
+          </p:style>
+        </p:cxnSp>
+      </p:grpSp>
+    </p:spTree>
+    <p:extLst>
+      <p:ext uri="{BB962C8B-B14F-4D97-AF65-F5344CB8AC3E}">
+        <p14:creationId xmlns:p14="http://schemas.microsoft.com/office/powerpoint/2010/main" val="673099284"/>
+      </p:ext>
+    </p:extLst>
+  </p:cSld>
+  <p:clrMapOvr>
+    <a:masterClrMapping/>
+  </p:clrMapOvr>
+</p:sld>
+</file>
+
+<file path=ppt/slides/slide4.xml><?xml version="1.0" encoding="utf-8"?>
+<p:sld xmlns:a="http://schemas.openxmlformats.org/drawingml/2006/main" xmlns:r="http://schemas.openxmlformats.org/officeDocument/2006/relationships" xmlns:p="http://schemas.openxmlformats.org/presentationml/2006/main">
+  <p:cSld>
+    <p:spTree>
+      <p:nvGrpSpPr>
+        <p:cNvPr id="1" name=""/>
+        <p:cNvGrpSpPr/>
+        <p:nvPr/>
+      </p:nvGrpSpPr>
+      <p:grpSpPr>
+        <a:xfrm>
+          <a:off x="0" y="0"/>
+          <a:ext cx="0" cy="0"/>
+          <a:chOff x="0" y="0"/>
+          <a:chExt cx="0" cy="0"/>
+        </a:xfrm>
+      </p:grpSpPr>
+      <p:sp>
+        <p:nvSpPr>
+          <p:cNvPr id="4" name="テキスト ボックス 3"/>
+          <p:cNvSpPr txBox="1"/>
+          <p:nvPr/>
+        </p:nvSpPr>
+        <p:spPr>
+          <a:xfrm>
+            <a:off x="200532" y="187161"/>
+            <a:ext cx="1620957" cy="523220"/>
+          </a:xfrm>
+          <a:prstGeom prst="rect">
+            <a:avLst/>
+          </a:prstGeom>
+          <a:noFill/>
+        </p:spPr>
+        <p:txBody>
+          <a:bodyPr wrap="none" rtlCol="0">
+            <a:spAutoFit/>
+          </a:bodyPr>
+          <a:lstStyle/>
+          <a:p>
+            <a:r>
+              <a:rPr lang="ja-JP" altLang="en-US" sz="2800" dirty="0" smtClean="0">
+                <a:latin typeface="メイリオ"/>
+                <a:ea typeface="メイリオ"/>
+                <a:cs typeface="メイリオ"/>
+              </a:rPr>
+              <a:t>管理</a:t>
+            </a:r>
+            <a:r>
+              <a:rPr lang="ja-JP" altLang="en-US" sz="2800" dirty="0" smtClean="0">
+                <a:latin typeface="メイリオ"/>
+                <a:ea typeface="メイリオ"/>
+                <a:cs typeface="メイリオ"/>
+              </a:rPr>
+              <a:t>画面</a:t>
             </a:r>
             <a:endParaRPr kumimoji="1" lang="ja-JP" altLang="en-US" sz="2000" dirty="0">
               <a:latin typeface="メイリオ"/>

</xml_diff>